<commit_message>
DS-6306 / Final commit to include all files
</commit_message>
<xml_diff>
--- a/BeersAndBreweries/EDA I – Part 1.pptx
+++ b/BeersAndBreweries/EDA I – Part 1.pptx
@@ -211,7 +211,7 @@
           <a:p>
             <a:fld id="{9F696B56-8B5D-B24B-AD03-72F94C57230D}" type="datetimeFigureOut">
               <a:rPr lang="en-US" smtClean="0"/>
-              <a:t>3/3/2023</a:t>
+              <a:t>3/4/2023</a:t>
             </a:fld>
             <a:endParaRPr lang="en-US"/>
           </a:p>
@@ -1319,7 +1319,7 @@
           <a:p>
             <a:fld id="{46BF16B6-8507-4900-B3DF-8BA44FFCABEE}" type="datetimeFigureOut">
               <a:rPr lang="en-US" smtClean="0"/>
-              <a:t>3/3/2023</a:t>
+              <a:t>3/4/2023</a:t>
             </a:fld>
             <a:endParaRPr lang="en-US"/>
           </a:p>
@@ -1646,7 +1646,7 @@
           <a:p>
             <a:fld id="{46BF16B6-8507-4900-B3DF-8BA44FFCABEE}" type="datetimeFigureOut">
               <a:rPr lang="en-US" smtClean="0"/>
-              <a:t>3/3/2023</a:t>
+              <a:t>3/4/2023</a:t>
             </a:fld>
             <a:endParaRPr lang="en-US"/>
           </a:p>
@@ -1897,7 +1897,7 @@
           <a:p>
             <a:fld id="{46BF16B6-8507-4900-B3DF-8BA44FFCABEE}" type="datetimeFigureOut">
               <a:rPr lang="en-US" smtClean="0"/>
-              <a:t>3/3/2023</a:t>
+              <a:t>3/4/2023</a:t>
             </a:fld>
             <a:endParaRPr lang="en-US"/>
           </a:p>
@@ -2239,7 +2239,7 @@
           <a:p>
             <a:fld id="{46BF16B6-8507-4900-B3DF-8BA44FFCABEE}" type="datetimeFigureOut">
               <a:rPr lang="en-US" smtClean="0"/>
-              <a:t>3/3/2023</a:t>
+              <a:t>3/4/2023</a:t>
             </a:fld>
             <a:endParaRPr lang="en-US"/>
           </a:p>
@@ -2589,7 +2589,7 @@
           <a:p>
             <a:fld id="{46BF16B6-8507-4900-B3DF-8BA44FFCABEE}" type="datetimeFigureOut">
               <a:rPr lang="en-US" smtClean="0"/>
-              <a:t>3/3/2023</a:t>
+              <a:t>3/4/2023</a:t>
             </a:fld>
             <a:endParaRPr lang="en-US"/>
           </a:p>
@@ -2966,7 +2966,7 @@
           <a:p>
             <a:fld id="{46BF16B6-8507-4900-B3DF-8BA44FFCABEE}" type="datetimeFigureOut">
               <a:rPr lang="en-US" smtClean="0"/>
-              <a:t>3/3/2023</a:t>
+              <a:t>3/4/2023</a:t>
             </a:fld>
             <a:endParaRPr lang="en-US"/>
           </a:p>
@@ -3439,7 +3439,7 @@
           <a:p>
             <a:fld id="{46BF16B6-8507-4900-B3DF-8BA44FFCABEE}" type="datetimeFigureOut">
               <a:rPr lang="en-US" smtClean="0"/>
-              <a:t>3/3/2023</a:t>
+              <a:t>3/4/2023</a:t>
             </a:fld>
             <a:endParaRPr lang="en-US"/>
           </a:p>
@@ -3647,7 +3647,7 @@
           <a:p>
             <a:fld id="{46BF16B6-8507-4900-B3DF-8BA44FFCABEE}" type="datetimeFigureOut">
               <a:rPr lang="en-US" smtClean="0"/>
-              <a:t>3/3/2023</a:t>
+              <a:t>3/4/2023</a:t>
             </a:fld>
             <a:endParaRPr lang="en-US"/>
           </a:p>
@@ -3861,7 +3861,7 @@
           <a:p>
             <a:fld id="{46BF16B6-8507-4900-B3DF-8BA44FFCABEE}" type="datetimeFigureOut">
               <a:rPr lang="en-US" smtClean="0"/>
-              <a:t>3/3/2023</a:t>
+              <a:t>3/4/2023</a:t>
             </a:fld>
             <a:endParaRPr lang="en-US"/>
           </a:p>
@@ -4096,7 +4096,7 @@
           <a:p>
             <a:fld id="{46BF16B6-8507-4900-B3DF-8BA44FFCABEE}" type="datetimeFigureOut">
               <a:rPr lang="en-US" smtClean="0"/>
-              <a:t>3/3/2023</a:t>
+              <a:t>3/4/2023</a:t>
             </a:fld>
             <a:endParaRPr lang="en-US"/>
           </a:p>
@@ -4347,7 +4347,7 @@
           <a:p>
             <a:fld id="{46BF16B6-8507-4900-B3DF-8BA44FFCABEE}" type="datetimeFigureOut">
               <a:rPr lang="en-US" smtClean="0"/>
-              <a:t>3/3/2023</a:t>
+              <a:t>3/4/2023</a:t>
             </a:fld>
             <a:endParaRPr lang="en-US"/>
           </a:p>
@@ -4617,7 +4617,7 @@
           <a:p>
             <a:fld id="{46BF16B6-8507-4900-B3DF-8BA44FFCABEE}" type="datetimeFigureOut">
               <a:rPr lang="en-US" smtClean="0"/>
-              <a:t>3/3/2023</a:t>
+              <a:t>3/4/2023</a:t>
             </a:fld>
             <a:endParaRPr lang="en-US"/>
           </a:p>
@@ -5033,7 +5033,7 @@
           <a:p>
             <a:fld id="{46BF16B6-8507-4900-B3DF-8BA44FFCABEE}" type="datetimeFigureOut">
               <a:rPr lang="en-US" smtClean="0"/>
-              <a:t>3/3/2023</a:t>
+              <a:t>3/4/2023</a:t>
             </a:fld>
             <a:endParaRPr lang="en-US"/>
           </a:p>
@@ -5185,7 +5185,7 @@
           <a:p>
             <a:fld id="{46BF16B6-8507-4900-B3DF-8BA44FFCABEE}" type="datetimeFigureOut">
               <a:rPr lang="en-US" smtClean="0"/>
-              <a:t>3/3/2023</a:t>
+              <a:t>3/4/2023</a:t>
             </a:fld>
             <a:endParaRPr lang="en-US"/>
           </a:p>
@@ -5314,7 +5314,7 @@
           <a:p>
             <a:fld id="{46BF16B6-8507-4900-B3DF-8BA44FFCABEE}" type="datetimeFigureOut">
               <a:rPr lang="en-US" smtClean="0"/>
-              <a:t>3/3/2023</a:t>
+              <a:t>3/4/2023</a:t>
             </a:fld>
             <a:endParaRPr lang="en-US"/>
           </a:p>
@@ -5572,7 +5572,7 @@
           <a:p>
             <a:fld id="{46BF16B6-8507-4900-B3DF-8BA44FFCABEE}" type="datetimeFigureOut">
               <a:rPr lang="en-US" smtClean="0"/>
-              <a:t>3/3/2023</a:t>
+              <a:t>3/4/2023</a:t>
             </a:fld>
             <a:endParaRPr lang="en-US"/>
           </a:p>
@@ -5890,7 +5890,7 @@
           <a:p>
             <a:fld id="{46BF16B6-8507-4900-B3DF-8BA44FFCABEE}" type="datetimeFigureOut">
               <a:rPr lang="en-US" smtClean="0"/>
-              <a:t>3/3/2023</a:t>
+              <a:t>3/4/2023</a:t>
             </a:fld>
             <a:endParaRPr lang="en-US"/>
           </a:p>
@@ -6244,7 +6244,7 @@
           <a:p>
             <a:fld id="{46BF16B6-8507-4900-B3DF-8BA44FFCABEE}" type="datetimeFigureOut">
               <a:rPr lang="en-US" smtClean="0"/>
-              <a:t>3/3/2023</a:t>
+              <a:t>3/4/2023</a:t>
             </a:fld>
             <a:endParaRPr lang="en-US"/>
           </a:p>
@@ -6813,7 +6813,7 @@
           <a:p>
             <a:r>
               <a:rPr lang="en-US" dirty="0"/>
-              <a:t>EDA I – Part 1</a:t>
+              <a:t>Market Analysis – Brewery and Beer Data</a:t>
             </a:r>
           </a:p>
         </p:txBody>
@@ -8486,35 +8486,47 @@
         <p:spPr/>
         <p:txBody>
           <a:bodyPr>
-            <a:normAutofit/>
+            <a:normAutofit fontScale="92500" lnSpcReduction="20000"/>
           </a:bodyPr>
           <a:lstStyle/>
           <a:p>
-            <a:r>
-              <a:rPr lang="en-US" dirty="0"/>
-              <a:t>Please reach out to:</a:t>
-            </a:r>
-          </a:p>
-          <a:p>
-            <a:pPr lvl="1"/>
-            <a:r>
-              <a:rPr lang="en-US" dirty="0"/>
-              <a:t>O’Neal Gray</a:t>
-            </a:r>
-          </a:p>
-          <a:p>
-            <a:pPr lvl="2"/>
-            <a:r>
-              <a:rPr lang="en-US" dirty="0"/>
-              <a:t>(214) 724-2020</a:t>
-            </a:r>
-          </a:p>
-          <a:p>
-            <a:pPr lvl="2"/>
             <a:r>
               <a:rPr lang="en-US" dirty="0">
                 <a:hlinkClick r:id="rId2"/>
               </a:rPr>
+              <a:t>https://github.com/DHLaurel/DoingDataScience/blob/master/BeersAndBreweries/README.md</a:t>
+            </a:r>
+            <a:r>
+              <a:rPr lang="en-US" dirty="0"/>
+              <a:t> </a:t>
+            </a:r>
+          </a:p>
+          <a:p>
+            <a:r>
+              <a:rPr lang="en-US" dirty="0"/>
+              <a:t>Please reach out to:</a:t>
+            </a:r>
+          </a:p>
+          <a:p>
+            <a:pPr lvl="1"/>
+            <a:r>
+              <a:rPr lang="en-US" dirty="0"/>
+              <a:t>O’Neal Gray</a:t>
+            </a:r>
+          </a:p>
+          <a:p>
+            <a:pPr lvl="2"/>
+            <a:r>
+              <a:rPr lang="en-US" dirty="0"/>
+              <a:t>(214) 724-2020</a:t>
+            </a:r>
+          </a:p>
+          <a:p>
+            <a:pPr lvl="2"/>
+            <a:r>
+              <a:rPr lang="en-US" dirty="0">
+                <a:hlinkClick r:id="rId3"/>
+              </a:rPr>
               <a:t>ogray@mail.smu.edu</a:t>
             </a:r>
             <a:endParaRPr lang="en-US" dirty="0"/>
@@ -8537,7 +8549,7 @@
             <a:pPr lvl="2"/>
             <a:r>
               <a:rPr lang="en-US" dirty="0">
-                <a:hlinkClick r:id="rId3"/>
+                <a:hlinkClick r:id="rId4"/>
               </a:rPr>
               <a:t>dlaurel@mail.smu.edu</a:t>
             </a:r>
@@ -8638,9 +8650,42 @@
               <a:buAutoNum type="arabicPeriod"/>
             </a:pPr>
             <a:r>
-              <a:rPr lang="en-US" dirty="0"/>
+              <a:rPr lang="en-US" dirty="0">
+                <a:hlinkClick r:id="rId2"/>
+              </a:rPr>
               <a:t>https://reason.com/2021/09/20/why-is-this-beer-banned-in-15-states/</a:t>
             </a:r>
+            <a:endParaRPr lang="en-US" dirty="0"/>
+          </a:p>
+          <a:p>
+            <a:pPr marL="457200" indent="-457200">
+              <a:buFont typeface="+mj-lt"/>
+              <a:buAutoNum type="arabicPeriod"/>
+            </a:pPr>
+            <a:r>
+              <a:rPr lang="en-US" u="sng" dirty="0"/>
+              <a:t>https://</a:t>
+            </a:r>
+            <a:r>
+              <a:rPr lang="en-US" u="sng" dirty="0" err="1"/>
+              <a:t>backgroundchecks.org</a:t>
+            </a:r>
+            <a:r>
+              <a:rPr lang="en-US" u="sng" dirty="0"/>
+              <a:t>/which-states-have-the-worst-dui-</a:t>
+            </a:r>
+            <a:r>
+              <a:rPr lang="en-US" u="sng" dirty="0" err="1"/>
+              <a:t>problems.html</a:t>
+            </a:r>
+            <a:endParaRPr lang="en-US" u="sng" dirty="0"/>
+          </a:p>
+          <a:p>
+            <a:pPr marL="457200" indent="-457200">
+              <a:buFont typeface="+mj-lt"/>
+              <a:buAutoNum type="arabicPeriod"/>
+            </a:pPr>
+            <a:endParaRPr lang="en-US" dirty="0"/>
           </a:p>
         </p:txBody>
       </p:sp>

</xml_diff>